<commit_message>
update met kleine aanpassing mbt beveiliging
</commit_message>
<xml_diff>
--- a/presentatie/Project beveiligde pasjes update.pptx
+++ b/presentatie/Project beveiligde pasjes update.pptx
@@ -118,7 +118,7 @@
   </p:defaultTextStyle>
   <p:extLst>
     <p:ext uri="{EFAFB233-063F-42B5-8137-9DF3F51BA10A}">
-      <p15:sldGuideLst xmlns:p15="http://schemas.microsoft.com/office/powerpoint/2012/main" xmlns="">
+      <p15:sldGuideLst xmlns="" xmlns:p15="http://schemas.microsoft.com/office/powerpoint/2012/main">
         <p15:guide id="1" orient="horz" pos="2160">
           <p15:clr>
             <a:srgbClr val="A4A3A4"/>
@@ -4095,35 +4095,83 @@
             </a:r>
             <a:r>
               <a:rPr lang="en-US" dirty="0" smtClean="0"/>
-              <a:t> op de </a:t>
+              <a:t> </a:t>
+            </a:r>
+            <a:r>
+              <a:rPr lang="en-US" dirty="0" err="1" smtClean="0"/>
+              <a:t>tussen</a:t>
+            </a:r>
+            <a:r>
+              <a:rPr lang="en-US" dirty="0" smtClean="0"/>
+              <a:t> </a:t>
+            </a:r>
+            <a:r>
+              <a:rPr lang="en-US" dirty="0" smtClean="0"/>
+              <a:t>de </a:t>
             </a:r>
             <a:r>
               <a:rPr lang="en-US" dirty="0" err="1" smtClean="0"/>
               <a:t>Arduino</a:t>
             </a:r>
+            <a:r>
+              <a:rPr lang="en-US" dirty="0" smtClean="0"/>
+              <a:t> en </a:t>
+            </a:r>
+            <a:r>
+              <a:rPr lang="en-US" smtClean="0"/>
+              <a:t>de computer</a:t>
+            </a:r>
             <a:endParaRPr lang="en-US" dirty="0" smtClean="0"/>
           </a:p>
           <a:p>
             <a:pPr lvl="1"/>
             <a:r>
+              <a:rPr lang="en-US" dirty="0" smtClean="0"/>
+              <a:t>De </a:t>
+            </a:r>
+            <a:r>
+              <a:rPr lang="en-US" dirty="0" err="1" smtClean="0"/>
+              <a:t>communicatie</a:t>
+            </a:r>
+            <a:r>
+              <a:rPr lang="en-US" dirty="0" smtClean="0"/>
+              <a:t> </a:t>
+            </a:r>
+            <a:r>
+              <a:rPr lang="en-US" dirty="0" err="1" smtClean="0"/>
+              <a:t>tussen</a:t>
+            </a:r>
+            <a:r>
+              <a:rPr lang="en-US" dirty="0" smtClean="0"/>
+              <a:t> de </a:t>
+            </a:r>
+            <a:r>
               <a:rPr lang="en-US" dirty="0" err="1" smtClean="0"/>
               <a:t>Arduino</a:t>
             </a:r>
             <a:r>
               <a:rPr lang="en-US" dirty="0" smtClean="0"/>
-              <a:t> </a:t>
-            </a:r>
-            <a:r>
-              <a:rPr lang="en-US" dirty="0" err="1" smtClean="0"/>
-              <a:t>werkt</a:t>
-            </a:r>
-            <a:r>
-              <a:rPr lang="en-US" dirty="0" smtClean="0"/>
-              <a:t> met bytes, Python </a:t>
-            </a:r>
-            <a:r>
-              <a:rPr lang="en-US" dirty="0" err="1" smtClean="0"/>
-              <a:t>wil</a:t>
+              <a:t> en de computer </a:t>
+            </a:r>
+            <a:r>
+              <a:rPr lang="en-US" dirty="0" err="1" smtClean="0"/>
+              <a:t>gaat</a:t>
+            </a:r>
+            <a:r>
+              <a:rPr lang="en-US" dirty="0" smtClean="0"/>
+              <a:t> in bytes, maar </a:t>
+            </a:r>
+            <a:r>
+              <a:rPr lang="en-US" dirty="0" err="1" smtClean="0"/>
+              <a:t>beiden</a:t>
+            </a:r>
+            <a:r>
+              <a:rPr lang="en-US" dirty="0" smtClean="0"/>
+              <a:t> </a:t>
+            </a:r>
+            <a:r>
+              <a:rPr lang="en-US" dirty="0" err="1" smtClean="0"/>
+              <a:t>willen</a:t>
             </a:r>
             <a:r>
               <a:rPr lang="en-US" dirty="0" smtClean="0"/>

</xml_diff>